<commit_message>
Updated metadata for "08. Unit Testing *"
</commit_message>
<xml_diff>
--- a/Courses/Software-Sciences/Module-1-OOP-New/08-Unit-Testing/08-Unit-Testing.pptx
+++ b/Courses/Software-Sciences/Module-1-OOP-New/08-Unit-Testing/08-Unit-Testing.pptx
@@ -393,7 +393,7 @@
           <a:p>
             <a:fld id="{4E087215-0C8F-4762-A664-737A353EC9A4}" type="datetimeFigureOut">
               <a:rPr lang="bg-BG" smtClean="0"/>
-              <a:t>2.01.23 г.</a:t>
+              <a:t>18.01.23 г.</a:t>
             </a:fld>
             <a:endParaRPr lang="bg-BG" dirty="0"/>
           </a:p>
@@ -584,7 +584,7 @@
           <a:p>
             <a:fld id="{72D84649-876A-46C9-8472-14CB09C070D8}" type="datetimeFigureOut">
               <a:rPr lang="en-US" smtClean="0"/>
-              <a:t>1/2/23</a:t>
+              <a:t>1/18/23</a:t>
             </a:fld>
             <a:endParaRPr lang="en-US" dirty="0"/>
           </a:p>

</xml_diff>